<commit_message>
defense.pptx nascent work nightly checkin
</commit_message>
<xml_diff>
--- a/presentations/defense_unused.pptx
+++ b/presentations/defense_unused.pptx
@@ -5,7 +5,7 @@
     <p:sldMasterId id="2147483660" r:id="rId1"/>
   </p:sldMasterIdLst>
   <p:notesMasterIdLst>
-    <p:notesMasterId r:id="rId9"/>
+    <p:notesMasterId r:id="rId18"/>
   </p:notesMasterIdLst>
   <p:sldIdLst>
     <p:sldId id="256" r:id="rId2"/>
@@ -15,6 +15,15 @@
     <p:sldId id="260" r:id="rId6"/>
     <p:sldId id="261" r:id="rId7"/>
     <p:sldId id="262" r:id="rId8"/>
+    <p:sldId id="264" r:id="rId9"/>
+    <p:sldId id="265" r:id="rId10"/>
+    <p:sldId id="266" r:id="rId11"/>
+    <p:sldId id="267" r:id="rId12"/>
+    <p:sldId id="268" r:id="rId13"/>
+    <p:sldId id="269" r:id="rId14"/>
+    <p:sldId id="270" r:id="rId15"/>
+    <p:sldId id="271" r:id="rId16"/>
+    <p:sldId id="263" r:id="rId17"/>
   </p:sldIdLst>
   <p:sldSz cx="9144000" cy="6858000" type="screen4x3"/>
   <p:notesSz cx="6858000" cy="9144000"/>
@@ -621,21 +630,15 @@
           <a:p>
             <a:r>
               <a:rPr lang="en-US" dirty="0" smtClean="0"/>
-              <a:t>y-axis</a:t>
-            </a:r>
-          </a:p>
-          <a:p>
+              <a:t>Focus on </a:t>
+            </a:r>
             <a:r>
               <a:rPr lang="en-US" dirty="0" err="1" smtClean="0"/>
-              <a:t>Zaret</a:t>
+              <a:t>gro</a:t>
             </a:r>
             <a:r>
               <a:rPr lang="en-US" dirty="0" smtClean="0"/>
-              <a:t> lab</a:t>
-            </a:r>
-            <a:r>
-              <a:rPr lang="en-US" baseline="0" dirty="0" smtClean="0"/>
-              <a:t> data</a:t>
+              <a:t> occupancy </a:t>
             </a:r>
             <a:endParaRPr lang="en-US" dirty="0"/>
           </a:p>
@@ -658,7 +661,7 @@
           <a:p>
             <a:fld id="{72D62022-544B-4C4F-96A3-6045A2BA2447}" type="slidenum">
               <a:rPr lang="en-US" smtClean="0"/>
-              <a:t>7</a:t>
+              <a:t>10</a:t>
             </a:fld>
             <a:endParaRPr lang="en-US"/>
           </a:p>
@@ -667,7 +670,107 @@
     </p:spTree>
     <p:extLst>
       <p:ext uri="{BB962C8B-B14F-4D97-AF65-F5344CB8AC3E}">
-        <p14:creationId xmlns:p14="http://schemas.microsoft.com/office/powerpoint/2010/main" val="1567599120"/>
+        <p14:creationId xmlns:p14="http://schemas.microsoft.com/office/powerpoint/2010/main" val="1190729741"/>
+      </p:ext>
+    </p:extLst>
+  </p:cSld>
+  <p:clrMapOvr>
+    <a:masterClrMapping/>
+  </p:clrMapOvr>
+</p:notes>
+</file>
+
+<file path=ppt/notesSlides/notesSlide3.xml><?xml version="1.0" encoding="utf-8"?>
+<p:notes xmlns:a="http://schemas.openxmlformats.org/drawingml/2006/main" xmlns:r="http://schemas.openxmlformats.org/officeDocument/2006/relationships" xmlns:p="http://schemas.openxmlformats.org/presentationml/2006/main">
+  <p:cSld>
+    <p:spTree>
+      <p:nvGrpSpPr>
+        <p:cNvPr id="1" name=""/>
+        <p:cNvGrpSpPr/>
+        <p:nvPr/>
+      </p:nvGrpSpPr>
+      <p:grpSpPr>
+        <a:xfrm>
+          <a:off x="0" y="0"/>
+          <a:ext cx="0" cy="0"/>
+          <a:chOff x="0" y="0"/>
+          <a:chExt cx="0" cy="0"/>
+        </a:xfrm>
+      </p:grpSpPr>
+      <p:sp>
+        <p:nvSpPr>
+          <p:cNvPr id="2" name="Slide Image Placeholder 1"/>
+          <p:cNvSpPr>
+            <a:spLocks noGrp="1" noRot="1" noChangeAspect="1"/>
+          </p:cNvSpPr>
+          <p:nvPr>
+            <p:ph type="sldImg"/>
+          </p:nvPr>
+        </p:nvSpPr>
+        <p:spPr/>
+      </p:sp>
+      <p:sp>
+        <p:nvSpPr>
+          <p:cNvPr id="3" name="Notes Placeholder 2"/>
+          <p:cNvSpPr>
+            <a:spLocks noGrp="1"/>
+          </p:cNvSpPr>
+          <p:nvPr>
+            <p:ph type="body" idx="1"/>
+          </p:nvPr>
+        </p:nvSpPr>
+        <p:spPr/>
+        <p:txBody>
+          <a:bodyPr/>
+          <a:lstStyle/>
+          <a:p>
+            <a:r>
+              <a:rPr lang="en-US" dirty="0" smtClean="0"/>
+              <a:t>Title</a:t>
+            </a:r>
+            <a:r>
+              <a:rPr lang="en-US" baseline="0" dirty="0" smtClean="0"/>
+              <a:t> </a:t>
+            </a:r>
+            <a:r>
+              <a:rPr lang="en-US" baseline="0" dirty="0" err="1" smtClean="0"/>
+              <a:t>chip-seq</a:t>
+            </a:r>
+            <a:r>
+              <a:rPr lang="en-US" baseline="0" dirty="0" smtClean="0"/>
+              <a:t> validation</a:t>
+            </a:r>
+            <a:endParaRPr lang="en-US" dirty="0"/>
+          </a:p>
+        </p:txBody>
+      </p:sp>
+      <p:sp>
+        <p:nvSpPr>
+          <p:cNvPr id="4" name="Slide Number Placeholder 3"/>
+          <p:cNvSpPr>
+            <a:spLocks noGrp="1"/>
+          </p:cNvSpPr>
+          <p:nvPr>
+            <p:ph type="sldNum" sz="quarter" idx="10"/>
+          </p:nvPr>
+        </p:nvSpPr>
+        <p:spPr/>
+        <p:txBody>
+          <a:bodyPr/>
+          <a:lstStyle/>
+          <a:p>
+            <a:fld id="{72D62022-544B-4C4F-96A3-6045A2BA2447}" type="slidenum">
+              <a:rPr lang="en-US" smtClean="0"/>
+              <a:t>11</a:t>
+            </a:fld>
+            <a:endParaRPr lang="en-US"/>
+          </a:p>
+        </p:txBody>
+      </p:sp>
+    </p:spTree>
+    <p:extLst>
+      <p:ext uri="{BB962C8B-B14F-4D97-AF65-F5344CB8AC3E}">
+        <p14:creationId xmlns:p14="http://schemas.microsoft.com/office/powerpoint/2010/main" val="1444356214"/>
       </p:ext>
     </p:extLst>
   </p:cSld>
@@ -3578,6 +3681,1950 @@
     <p:extLst>
       <p:ext uri="{BB962C8B-B14F-4D97-AF65-F5344CB8AC3E}">
         <p14:creationId xmlns:p14="http://schemas.microsoft.com/office/powerpoint/2010/main" val="1784229822"/>
+      </p:ext>
+    </p:extLst>
+  </p:cSld>
+  <p:clrMapOvr>
+    <a:masterClrMapping/>
+  </p:clrMapOvr>
+</p:sld>
+</file>
+
+<file path=ppt/slides/slide10.xml><?xml version="1.0" encoding="utf-8"?>
+<p:sld xmlns:a="http://schemas.openxmlformats.org/drawingml/2006/main" xmlns:r="http://schemas.openxmlformats.org/officeDocument/2006/relationships" xmlns:p="http://schemas.openxmlformats.org/presentationml/2006/main">
+  <p:cSld>
+    <p:spTree>
+      <p:nvGrpSpPr>
+        <p:cNvPr id="1" name=""/>
+        <p:cNvGrpSpPr/>
+        <p:nvPr/>
+      </p:nvGrpSpPr>
+      <p:grpSpPr>
+        <a:xfrm>
+          <a:off x="0" y="0"/>
+          <a:ext cx="0" cy="0"/>
+          <a:chOff x="0" y="0"/>
+          <a:chExt cx="0" cy="0"/>
+        </a:xfrm>
+      </p:grpSpPr>
+      <p:sp>
+        <p:nvSpPr>
+          <p:cNvPr id="2" name="Title 1"/>
+          <p:cNvSpPr>
+            <a:spLocks noGrp="1"/>
+          </p:cNvSpPr>
+          <p:nvPr>
+            <p:ph type="title"/>
+          </p:nvPr>
+        </p:nvSpPr>
+        <p:spPr/>
+        <p:txBody>
+          <a:bodyPr/>
+          <a:lstStyle/>
+          <a:p>
+            <a:endParaRPr lang="en-US"/>
+          </a:p>
+        </p:txBody>
+      </p:sp>
+      <p:pic>
+        <p:nvPicPr>
+          <p:cNvPr id="6" name="Picture 5"/>
+          <p:cNvPicPr>
+            <a:picLocks noChangeAspect="1"/>
+          </p:cNvPicPr>
+          <p:nvPr/>
+        </p:nvPicPr>
+        <p:blipFill>
+          <a:blip r:embed="rId3">
+            <a:extLst>
+              <a:ext uri="{28A0092B-C50C-407E-A947-70E740481C1C}">
+                <a14:useLocalDpi xmlns:a14="http://schemas.microsoft.com/office/drawing/2010/main" val="0"/>
+              </a:ext>
+            </a:extLst>
+          </a:blip>
+          <a:stretch>
+            <a:fillRect/>
+          </a:stretch>
+        </p:blipFill>
+        <p:spPr>
+          <a:xfrm>
+            <a:off x="408150" y="2380549"/>
+            <a:ext cx="3420899" cy="3417860"/>
+          </a:xfrm>
+          <a:prstGeom prst="rect">
+            <a:avLst/>
+          </a:prstGeom>
+        </p:spPr>
+      </p:pic>
+      <p:pic>
+        <p:nvPicPr>
+          <p:cNvPr id="7" name="Picture 6"/>
+          <p:cNvPicPr>
+            <a:picLocks noChangeAspect="1"/>
+          </p:cNvPicPr>
+          <p:nvPr/>
+        </p:nvPicPr>
+        <p:blipFill>
+          <a:blip r:embed="rId4">
+            <a:extLst>
+              <a:ext uri="{28A0092B-C50C-407E-A947-70E740481C1C}">
+                <a14:useLocalDpi xmlns:a14="http://schemas.microsoft.com/office/drawing/2010/main" val="0"/>
+              </a:ext>
+            </a:extLst>
+          </a:blip>
+          <a:stretch>
+            <a:fillRect/>
+          </a:stretch>
+        </p:blipFill>
+        <p:spPr>
+          <a:xfrm>
+            <a:off x="4657725" y="1858016"/>
+            <a:ext cx="3857625" cy="2231463"/>
+          </a:xfrm>
+          <a:prstGeom prst="rect">
+            <a:avLst/>
+          </a:prstGeom>
+        </p:spPr>
+      </p:pic>
+      <p:pic>
+        <p:nvPicPr>
+          <p:cNvPr id="8" name="Picture 7"/>
+          <p:cNvPicPr>
+            <a:picLocks noChangeAspect="1"/>
+          </p:cNvPicPr>
+          <p:nvPr/>
+        </p:nvPicPr>
+        <p:blipFill>
+          <a:blip r:embed="rId5">
+            <a:extLst>
+              <a:ext uri="{28A0092B-C50C-407E-A947-70E740481C1C}">
+                <a14:useLocalDpi xmlns:a14="http://schemas.microsoft.com/office/drawing/2010/main" val="0"/>
+              </a:ext>
+            </a:extLst>
+          </a:blip>
+          <a:stretch>
+            <a:fillRect/>
+          </a:stretch>
+        </p:blipFill>
+        <p:spPr>
+          <a:xfrm>
+            <a:off x="4657725" y="4210115"/>
+            <a:ext cx="3857625" cy="2231463"/>
+          </a:xfrm>
+          <a:prstGeom prst="rect">
+            <a:avLst/>
+          </a:prstGeom>
+        </p:spPr>
+      </p:pic>
+      <p:sp>
+        <p:nvSpPr>
+          <p:cNvPr id="9" name="TextBox 8"/>
+          <p:cNvSpPr txBox="1"/>
+          <p:nvPr/>
+        </p:nvSpPr>
+        <p:spPr>
+          <a:xfrm rot="16200000">
+            <a:off x="3425982" y="5002680"/>
+            <a:ext cx="1817156" cy="646331"/>
+          </a:xfrm>
+          <a:prstGeom prst="rect">
+            <a:avLst/>
+          </a:prstGeom>
+          <a:noFill/>
+        </p:spPr>
+        <p:txBody>
+          <a:bodyPr wrap="square" rtlCol="0">
+            <a:spAutoFit/>
+          </a:bodyPr>
+          <a:lstStyle/>
+          <a:p>
+            <a:r>
+              <a:rPr lang="en-US" dirty="0" smtClean="0"/>
+              <a:t>Gro Targets by Occupancy Score </a:t>
+            </a:r>
+            <a:endParaRPr lang="en-US" dirty="0"/>
+          </a:p>
+        </p:txBody>
+      </p:sp>
+      <p:sp>
+        <p:nvSpPr>
+          <p:cNvPr id="10" name="TextBox 9"/>
+          <p:cNvSpPr txBox="1"/>
+          <p:nvPr/>
+        </p:nvSpPr>
+        <p:spPr>
+          <a:xfrm rot="16200000">
+            <a:off x="3428939" y="2650581"/>
+            <a:ext cx="1811241" cy="646331"/>
+          </a:xfrm>
+          <a:prstGeom prst="rect">
+            <a:avLst/>
+          </a:prstGeom>
+          <a:noFill/>
+        </p:spPr>
+        <p:txBody>
+          <a:bodyPr wrap="square" rtlCol="0">
+            <a:spAutoFit/>
+          </a:bodyPr>
+          <a:lstStyle/>
+          <a:p>
+            <a:r>
+              <a:rPr lang="en-US" dirty="0" smtClean="0"/>
+              <a:t>Gro Targets by Dosage Response</a:t>
+            </a:r>
+            <a:endParaRPr lang="en-US" dirty="0"/>
+          </a:p>
+        </p:txBody>
+      </p:sp>
+    </p:spTree>
+    <p:extLst>
+      <p:ext uri="{BB962C8B-B14F-4D97-AF65-F5344CB8AC3E}">
+        <p14:creationId xmlns:p14="http://schemas.microsoft.com/office/powerpoint/2010/main" val="2080729127"/>
+      </p:ext>
+    </p:extLst>
+  </p:cSld>
+  <p:clrMapOvr>
+    <a:masterClrMapping/>
+  </p:clrMapOvr>
+  <p:timing>
+    <p:tnLst>
+      <p:par>
+        <p:cTn id="1" dur="indefinite" restart="never" nodeType="tmRoot"/>
+      </p:par>
+    </p:tnLst>
+  </p:timing>
+</p:sld>
+</file>
+
+<file path=ppt/slides/slide11.xml><?xml version="1.0" encoding="utf-8"?>
+<p:sld xmlns:a="http://schemas.openxmlformats.org/drawingml/2006/main" xmlns:r="http://schemas.openxmlformats.org/officeDocument/2006/relationships" xmlns:p="http://schemas.openxmlformats.org/presentationml/2006/main">
+  <p:cSld>
+    <p:spTree>
+      <p:nvGrpSpPr>
+        <p:cNvPr id="1" name=""/>
+        <p:cNvGrpSpPr/>
+        <p:nvPr/>
+      </p:nvGrpSpPr>
+      <p:grpSpPr>
+        <a:xfrm>
+          <a:off x="0" y="0"/>
+          <a:ext cx="0" cy="0"/>
+          <a:chOff x="0" y="0"/>
+          <a:chExt cx="0" cy="0"/>
+        </a:xfrm>
+      </p:grpSpPr>
+      <p:sp>
+        <p:nvSpPr>
+          <p:cNvPr id="2" name="Title 1"/>
+          <p:cNvSpPr>
+            <a:spLocks noGrp="1"/>
+          </p:cNvSpPr>
+          <p:nvPr>
+            <p:ph type="title"/>
+          </p:nvPr>
+        </p:nvSpPr>
+        <p:spPr/>
+        <p:txBody>
+          <a:bodyPr/>
+          <a:lstStyle/>
+          <a:p>
+            <a:endParaRPr lang="en-US"/>
+          </a:p>
+        </p:txBody>
+      </p:sp>
+      <p:grpSp>
+        <p:nvGrpSpPr>
+          <p:cNvPr id="21" name="Group 20"/>
+          <p:cNvGrpSpPr/>
+          <p:nvPr/>
+        </p:nvGrpSpPr>
+        <p:grpSpPr>
+          <a:xfrm>
+            <a:off x="3643544" y="3729428"/>
+            <a:ext cx="5258506" cy="3550023"/>
+            <a:chOff x="3879686" y="2043953"/>
+            <a:chExt cx="5258506" cy="3550023"/>
+          </a:xfrm>
+        </p:grpSpPr>
+        <p:pic>
+          <p:nvPicPr>
+            <p:cNvPr id="5" name="Picture 4"/>
+            <p:cNvPicPr>
+              <a:picLocks noChangeAspect="1"/>
+            </p:cNvPicPr>
+            <p:nvPr/>
+          </p:nvPicPr>
+          <p:blipFill>
+            <a:blip r:embed="rId3">
+              <a:extLst>
+                <a:ext uri="{28A0092B-C50C-407E-A947-70E740481C1C}">
+                  <a14:useLocalDpi xmlns:a14="http://schemas.microsoft.com/office/drawing/2010/main" val="0"/>
+                </a:ext>
+              </a:extLst>
+            </a:blip>
+            <a:stretch>
+              <a:fillRect/>
+            </a:stretch>
+          </p:blipFill>
+          <p:spPr>
+            <a:xfrm flipH="1">
+              <a:off x="4558553" y="2043953"/>
+              <a:ext cx="3550023" cy="3550023"/>
+            </a:xfrm>
+            <a:prstGeom prst="rect">
+              <a:avLst/>
+            </a:prstGeom>
+          </p:spPr>
+        </p:pic>
+        <p:sp>
+          <p:nvSpPr>
+            <p:cNvPr id="9" name="Rectangle 8"/>
+            <p:cNvSpPr/>
+            <p:nvPr/>
+          </p:nvSpPr>
+          <p:spPr>
+            <a:xfrm>
+              <a:off x="7637929" y="4552293"/>
+              <a:ext cx="1075764" cy="504727"/>
+            </a:xfrm>
+            <a:prstGeom prst="rect">
+              <a:avLst/>
+            </a:prstGeom>
+            <a:solidFill>
+              <a:schemeClr val="bg1"/>
+            </a:solidFill>
+            <a:ln>
+              <a:noFill/>
+            </a:ln>
+          </p:spPr>
+          <p:style>
+            <a:lnRef idx="2">
+              <a:schemeClr val="accent1">
+                <a:shade val="50000"/>
+              </a:schemeClr>
+            </a:lnRef>
+            <a:fillRef idx="1">
+              <a:schemeClr val="accent1"/>
+            </a:fillRef>
+            <a:effectRef idx="0">
+              <a:schemeClr val="accent1"/>
+            </a:effectRef>
+            <a:fontRef idx="minor">
+              <a:schemeClr val="lt1"/>
+            </a:fontRef>
+          </p:style>
+          <p:txBody>
+            <a:bodyPr rtlCol="0" anchor="ctr"/>
+            <a:lstStyle/>
+            <a:p>
+              <a:pPr algn="ctr"/>
+              <a:endParaRPr lang="en-US"/>
+            </a:p>
+          </p:txBody>
+        </p:sp>
+        <p:sp>
+          <p:nvSpPr>
+            <p:cNvPr id="10" name="Rectangle 9"/>
+            <p:cNvSpPr/>
+            <p:nvPr/>
+          </p:nvSpPr>
+          <p:spPr>
+            <a:xfrm>
+              <a:off x="7301753" y="4992914"/>
+              <a:ext cx="1075764" cy="504727"/>
+            </a:xfrm>
+            <a:prstGeom prst="rect">
+              <a:avLst/>
+            </a:prstGeom>
+            <a:solidFill>
+              <a:schemeClr val="bg1"/>
+            </a:solidFill>
+            <a:ln>
+              <a:noFill/>
+            </a:ln>
+          </p:spPr>
+          <p:style>
+            <a:lnRef idx="2">
+              <a:schemeClr val="accent1">
+                <a:shade val="50000"/>
+              </a:schemeClr>
+            </a:lnRef>
+            <a:fillRef idx="1">
+              <a:schemeClr val="accent1"/>
+            </a:fillRef>
+            <a:effectRef idx="0">
+              <a:schemeClr val="accent1"/>
+            </a:effectRef>
+            <a:fontRef idx="minor">
+              <a:schemeClr val="lt1"/>
+            </a:fontRef>
+          </p:style>
+          <p:txBody>
+            <a:bodyPr rtlCol="0" anchor="ctr"/>
+            <a:lstStyle/>
+            <a:p>
+              <a:pPr algn="ctr"/>
+              <a:endParaRPr lang="en-US"/>
+            </a:p>
+          </p:txBody>
+        </p:sp>
+        <p:sp>
+          <p:nvSpPr>
+            <p:cNvPr id="11" name="Rectangle 10"/>
+            <p:cNvSpPr/>
+            <p:nvPr/>
+          </p:nvSpPr>
+          <p:spPr>
+            <a:xfrm>
+              <a:off x="4148419" y="4552293"/>
+              <a:ext cx="1075764" cy="809443"/>
+            </a:xfrm>
+            <a:prstGeom prst="rect">
+              <a:avLst/>
+            </a:prstGeom>
+            <a:solidFill>
+              <a:schemeClr val="bg1"/>
+            </a:solidFill>
+            <a:ln>
+              <a:noFill/>
+            </a:ln>
+          </p:spPr>
+          <p:style>
+            <a:lnRef idx="2">
+              <a:schemeClr val="accent1">
+                <a:shade val="50000"/>
+              </a:schemeClr>
+            </a:lnRef>
+            <a:fillRef idx="1">
+              <a:schemeClr val="accent1"/>
+            </a:fillRef>
+            <a:effectRef idx="0">
+              <a:schemeClr val="accent1"/>
+            </a:effectRef>
+            <a:fontRef idx="minor">
+              <a:schemeClr val="lt1"/>
+            </a:fontRef>
+          </p:style>
+          <p:txBody>
+            <a:bodyPr rtlCol="0" anchor="ctr"/>
+            <a:lstStyle/>
+            <a:p>
+              <a:pPr algn="ctr"/>
+              <a:endParaRPr lang="en-US"/>
+            </a:p>
+          </p:txBody>
+        </p:sp>
+        <p:sp>
+          <p:nvSpPr>
+            <p:cNvPr id="14" name="TextBox 13"/>
+            <p:cNvSpPr txBox="1"/>
+            <p:nvPr/>
+          </p:nvSpPr>
+          <p:spPr>
+            <a:xfrm>
+              <a:off x="3879686" y="3495366"/>
+              <a:ext cx="738023" cy="646331"/>
+            </a:xfrm>
+            <a:prstGeom prst="rect">
+              <a:avLst/>
+            </a:prstGeom>
+            <a:noFill/>
+          </p:spPr>
+          <p:txBody>
+            <a:bodyPr wrap="none" rtlCol="0">
+              <a:spAutoFit/>
+            </a:bodyPr>
+            <a:lstStyle/>
+            <a:p>
+              <a:r>
+                <a:rPr lang="en-US" sz="1200" dirty="0" smtClean="0"/>
+                <a:t>Embryo</a:t>
+              </a:r>
+            </a:p>
+            <a:p>
+              <a:r>
+                <a:rPr lang="en-US" sz="1200" dirty="0" err="1" smtClean="0"/>
+                <a:t>Gro</a:t>
+              </a:r>
+              <a:r>
+                <a:rPr lang="en-US" sz="1200" dirty="0" smtClean="0"/>
+                <a:t> </a:t>
+              </a:r>
+              <a:r>
+                <a:rPr lang="en-US" sz="1200" dirty="0" err="1" smtClean="0"/>
+                <a:t>ChIP</a:t>
+              </a:r>
+              <a:endParaRPr lang="en-US" sz="1200" dirty="0" smtClean="0"/>
+            </a:p>
+            <a:p>
+              <a:r>
+                <a:rPr lang="en-US" sz="1200" dirty="0" smtClean="0"/>
+                <a:t>All Peaks</a:t>
+              </a:r>
+              <a:endParaRPr lang="en-US" sz="1200" dirty="0"/>
+            </a:p>
+          </p:txBody>
+        </p:sp>
+        <p:sp>
+          <p:nvSpPr>
+            <p:cNvPr id="15" name="Rectangle 14"/>
+            <p:cNvSpPr/>
+            <p:nvPr/>
+          </p:nvSpPr>
+          <p:spPr>
+            <a:xfrm>
+              <a:off x="4982955" y="3577458"/>
+              <a:ext cx="640581" cy="564239"/>
+            </a:xfrm>
+            <a:prstGeom prst="rect">
+              <a:avLst/>
+            </a:prstGeom>
+            <a:solidFill>
+              <a:srgbClr val="9398FF"/>
+            </a:solidFill>
+            <a:ln>
+              <a:noFill/>
+            </a:ln>
+          </p:spPr>
+          <p:style>
+            <a:lnRef idx="2">
+              <a:schemeClr val="accent1">
+                <a:shade val="50000"/>
+              </a:schemeClr>
+            </a:lnRef>
+            <a:fillRef idx="1">
+              <a:schemeClr val="accent1"/>
+            </a:fillRef>
+            <a:effectRef idx="0">
+              <a:schemeClr val="accent1"/>
+            </a:effectRef>
+            <a:fontRef idx="minor">
+              <a:schemeClr val="lt1"/>
+            </a:fontRef>
+          </p:style>
+          <p:txBody>
+            <a:bodyPr rtlCol="0" anchor="ctr"/>
+            <a:lstStyle/>
+            <a:p>
+              <a:pPr algn="ctr"/>
+              <a:r>
+                <a:rPr lang="en-US" sz="1200" dirty="0" smtClean="0">
+                  <a:solidFill>
+                    <a:sysClr val="windowText" lastClr="000000"/>
+                  </a:solidFill>
+                </a:rPr>
+                <a:t>3823</a:t>
+              </a:r>
+              <a:endParaRPr lang="en-US" sz="1200" dirty="0">
+                <a:solidFill>
+                  <a:sysClr val="windowText" lastClr="000000"/>
+                </a:solidFill>
+              </a:endParaRPr>
+            </a:p>
+          </p:txBody>
+        </p:sp>
+        <p:sp>
+          <p:nvSpPr>
+            <p:cNvPr id="16" name="Rectangle 15"/>
+            <p:cNvSpPr/>
+            <p:nvPr/>
+          </p:nvSpPr>
+          <p:spPr>
+            <a:xfrm>
+              <a:off x="5778649" y="3727094"/>
+              <a:ext cx="554916" cy="264965"/>
+            </a:xfrm>
+            <a:prstGeom prst="rect">
+              <a:avLst/>
+            </a:prstGeom>
+            <a:solidFill>
+              <a:srgbClr val="5894CC"/>
+            </a:solidFill>
+            <a:ln>
+              <a:noFill/>
+            </a:ln>
+          </p:spPr>
+          <p:style>
+            <a:lnRef idx="2">
+              <a:schemeClr val="accent1">
+                <a:shade val="50000"/>
+              </a:schemeClr>
+            </a:lnRef>
+            <a:fillRef idx="1">
+              <a:schemeClr val="accent1"/>
+            </a:fillRef>
+            <a:effectRef idx="0">
+              <a:schemeClr val="accent1"/>
+            </a:effectRef>
+            <a:fontRef idx="minor">
+              <a:schemeClr val="lt1"/>
+            </a:fontRef>
+          </p:style>
+          <p:txBody>
+            <a:bodyPr rtlCol="0" anchor="ctr"/>
+            <a:lstStyle/>
+            <a:p>
+              <a:pPr algn="ctr"/>
+              <a:r>
+                <a:rPr lang="en-US" sz="1200" dirty="0" smtClean="0">
+                  <a:solidFill>
+                    <a:sysClr val="windowText" lastClr="000000"/>
+                  </a:solidFill>
+                </a:rPr>
+                <a:t>1885</a:t>
+              </a:r>
+              <a:endParaRPr lang="en-US" sz="1200" dirty="0">
+                <a:solidFill>
+                  <a:sysClr val="windowText" lastClr="000000"/>
+                </a:solidFill>
+              </a:endParaRPr>
+            </a:p>
+          </p:txBody>
+        </p:sp>
+        <p:sp>
+          <p:nvSpPr>
+            <p:cNvPr id="17" name="Rectangle 16"/>
+            <p:cNvSpPr/>
+            <p:nvPr/>
+          </p:nvSpPr>
+          <p:spPr>
+            <a:xfrm>
+              <a:off x="6843631" y="3727094"/>
+              <a:ext cx="554916" cy="264965"/>
+            </a:xfrm>
+            <a:prstGeom prst="rect">
+              <a:avLst/>
+            </a:prstGeom>
+            <a:solidFill>
+              <a:srgbClr val="9FFC95"/>
+            </a:solidFill>
+            <a:ln>
+              <a:noFill/>
+            </a:ln>
+          </p:spPr>
+          <p:style>
+            <a:lnRef idx="2">
+              <a:schemeClr val="accent1">
+                <a:shade val="50000"/>
+              </a:schemeClr>
+            </a:lnRef>
+            <a:fillRef idx="1">
+              <a:schemeClr val="accent1"/>
+            </a:fillRef>
+            <a:effectRef idx="0">
+              <a:schemeClr val="accent1"/>
+            </a:effectRef>
+            <a:fontRef idx="minor">
+              <a:schemeClr val="lt1"/>
+            </a:fontRef>
+          </p:style>
+          <p:txBody>
+            <a:bodyPr rtlCol="0" anchor="ctr"/>
+            <a:lstStyle/>
+            <a:p>
+              <a:pPr algn="ctr"/>
+              <a:r>
+                <a:rPr lang="en-US" sz="1200" smtClean="0">
+                  <a:solidFill>
+                    <a:sysClr val="windowText" lastClr="000000"/>
+                  </a:solidFill>
+                </a:rPr>
+                <a:t>9137</a:t>
+              </a:r>
+              <a:endParaRPr lang="en-US" sz="1200" dirty="0">
+                <a:solidFill>
+                  <a:sysClr val="windowText" lastClr="000000"/>
+                </a:solidFill>
+              </a:endParaRPr>
+            </a:p>
+          </p:txBody>
+        </p:sp>
+        <p:sp>
+          <p:nvSpPr>
+            <p:cNvPr id="18" name="TextBox 17"/>
+            <p:cNvSpPr txBox="1"/>
+            <p:nvPr/>
+          </p:nvSpPr>
+          <p:spPr>
+            <a:xfrm>
+              <a:off x="7894262" y="3420452"/>
+              <a:ext cx="1243930" cy="646331"/>
+            </a:xfrm>
+            <a:prstGeom prst="rect">
+              <a:avLst/>
+            </a:prstGeom>
+            <a:noFill/>
+          </p:spPr>
+          <p:txBody>
+            <a:bodyPr wrap="none" rtlCol="0">
+              <a:spAutoFit/>
+            </a:bodyPr>
+            <a:lstStyle/>
+            <a:p>
+              <a:r>
+                <a:rPr lang="en-US" sz="1200" dirty="0" err="1" smtClean="0"/>
+                <a:t>modENCODE</a:t>
+              </a:r>
+              <a:endParaRPr lang="en-US" sz="1200" dirty="0" smtClean="0"/>
+            </a:p>
+            <a:p>
+              <a:r>
+                <a:rPr lang="en-US" sz="1200" dirty="0" smtClean="0"/>
+                <a:t>White Pre-Pupae</a:t>
+              </a:r>
+            </a:p>
+            <a:p>
+              <a:r>
+                <a:rPr lang="en-US" sz="1200" dirty="0" err="1" smtClean="0"/>
+                <a:t>Gro</a:t>
+              </a:r>
+              <a:r>
+                <a:rPr lang="en-US" sz="1200" dirty="0" smtClean="0"/>
+                <a:t> </a:t>
+              </a:r>
+              <a:r>
+                <a:rPr lang="en-US" sz="1200" dirty="0" err="1" smtClean="0"/>
+                <a:t>ChIP</a:t>
+              </a:r>
+              <a:r>
+                <a:rPr lang="en-US" sz="1200" dirty="0" smtClean="0"/>
+                <a:t>-chip</a:t>
+              </a:r>
+              <a:endParaRPr lang="en-US" sz="1200" dirty="0"/>
+            </a:p>
+          </p:txBody>
+        </p:sp>
+      </p:grpSp>
+      <p:grpSp>
+        <p:nvGrpSpPr>
+          <p:cNvPr id="20" name="Group 19"/>
+          <p:cNvGrpSpPr/>
+          <p:nvPr/>
+        </p:nvGrpSpPr>
+        <p:grpSpPr>
+          <a:xfrm>
+            <a:off x="214937" y="857803"/>
+            <a:ext cx="5020013" cy="3556285"/>
+            <a:chOff x="313749" y="1363959"/>
+            <a:chExt cx="5020013" cy="3556285"/>
+          </a:xfrm>
+        </p:grpSpPr>
+        <p:pic>
+          <p:nvPicPr>
+            <p:cNvPr id="23" name="Picture 22"/>
+            <p:cNvPicPr>
+              <a:picLocks noChangeAspect="1"/>
+            </p:cNvPicPr>
+            <p:nvPr/>
+          </p:nvPicPr>
+          <p:blipFill>
+            <a:blip r:embed="rId4">
+              <a:extLst>
+                <a:ext uri="{28A0092B-C50C-407E-A947-70E740481C1C}">
+                  <a14:useLocalDpi xmlns:a14="http://schemas.microsoft.com/office/drawing/2010/main" val="0"/>
+                </a:ext>
+              </a:extLst>
+            </a:blip>
+            <a:stretch>
+              <a:fillRect/>
+            </a:stretch>
+          </p:blipFill>
+          <p:spPr>
+            <a:xfrm>
+              <a:off x="1119006" y="1363959"/>
+              <a:ext cx="3556285" cy="3556285"/>
+            </a:xfrm>
+            <a:prstGeom prst="rect">
+              <a:avLst/>
+            </a:prstGeom>
+          </p:spPr>
+        </p:pic>
+        <p:sp>
+          <p:nvSpPr>
+            <p:cNvPr id="24" name="Rectangle 23"/>
+            <p:cNvSpPr/>
+            <p:nvPr/>
+          </p:nvSpPr>
+          <p:spPr>
+            <a:xfrm>
+              <a:off x="4131147" y="2123257"/>
+              <a:ext cx="1075764" cy="504727"/>
+            </a:xfrm>
+            <a:prstGeom prst="rect">
+              <a:avLst/>
+            </a:prstGeom>
+            <a:solidFill>
+              <a:schemeClr val="bg1"/>
+            </a:solidFill>
+            <a:ln>
+              <a:noFill/>
+            </a:ln>
+          </p:spPr>
+          <p:style>
+            <a:lnRef idx="2">
+              <a:schemeClr val="accent1">
+                <a:shade val="50000"/>
+              </a:schemeClr>
+            </a:lnRef>
+            <a:fillRef idx="1">
+              <a:schemeClr val="accent1"/>
+            </a:fillRef>
+            <a:effectRef idx="0">
+              <a:schemeClr val="accent1"/>
+            </a:effectRef>
+            <a:fontRef idx="minor">
+              <a:schemeClr val="lt1"/>
+            </a:fontRef>
+          </p:style>
+          <p:txBody>
+            <a:bodyPr rtlCol="0" anchor="ctr"/>
+            <a:lstStyle/>
+            <a:p>
+              <a:pPr algn="ctr"/>
+              <a:endParaRPr lang="en-US"/>
+            </a:p>
+          </p:txBody>
+        </p:sp>
+        <p:sp>
+          <p:nvSpPr>
+            <p:cNvPr id="25" name="Rectangle 24"/>
+            <p:cNvSpPr/>
+            <p:nvPr/>
+          </p:nvSpPr>
+          <p:spPr>
+            <a:xfrm>
+              <a:off x="581124" y="1518951"/>
+              <a:ext cx="1075764" cy="504727"/>
+            </a:xfrm>
+            <a:prstGeom prst="rect">
+              <a:avLst/>
+            </a:prstGeom>
+            <a:solidFill>
+              <a:schemeClr val="bg1"/>
+            </a:solidFill>
+            <a:ln>
+              <a:noFill/>
+            </a:ln>
+          </p:spPr>
+          <p:style>
+            <a:lnRef idx="2">
+              <a:schemeClr val="accent1">
+                <a:shade val="50000"/>
+              </a:schemeClr>
+            </a:lnRef>
+            <a:fillRef idx="1">
+              <a:schemeClr val="accent1"/>
+            </a:fillRef>
+            <a:effectRef idx="0">
+              <a:schemeClr val="accent1"/>
+            </a:effectRef>
+            <a:fontRef idx="minor">
+              <a:schemeClr val="lt1"/>
+            </a:fontRef>
+          </p:style>
+          <p:txBody>
+            <a:bodyPr rtlCol="0" anchor="ctr"/>
+            <a:lstStyle/>
+            <a:p>
+              <a:pPr algn="ctr"/>
+              <a:endParaRPr lang="en-US"/>
+            </a:p>
+          </p:txBody>
+        </p:sp>
+        <p:sp>
+          <p:nvSpPr>
+            <p:cNvPr id="26" name="Rectangle 25"/>
+            <p:cNvSpPr/>
+            <p:nvPr/>
+          </p:nvSpPr>
+          <p:spPr>
+            <a:xfrm>
+              <a:off x="3865337" y="4227260"/>
+              <a:ext cx="1075764" cy="504727"/>
+            </a:xfrm>
+            <a:prstGeom prst="rect">
+              <a:avLst/>
+            </a:prstGeom>
+            <a:solidFill>
+              <a:schemeClr val="bg1"/>
+            </a:solidFill>
+            <a:ln>
+              <a:noFill/>
+            </a:ln>
+          </p:spPr>
+          <p:style>
+            <a:lnRef idx="2">
+              <a:schemeClr val="accent1">
+                <a:shade val="50000"/>
+              </a:schemeClr>
+            </a:lnRef>
+            <a:fillRef idx="1">
+              <a:schemeClr val="accent1"/>
+            </a:fillRef>
+            <a:effectRef idx="0">
+              <a:schemeClr val="accent1"/>
+            </a:effectRef>
+            <a:fontRef idx="minor">
+              <a:schemeClr val="lt1"/>
+            </a:fontRef>
+          </p:style>
+          <p:txBody>
+            <a:bodyPr rtlCol="0" anchor="ctr"/>
+            <a:lstStyle/>
+            <a:p>
+              <a:pPr algn="ctr"/>
+              <a:endParaRPr lang="en-US"/>
+            </a:p>
+          </p:txBody>
+        </p:sp>
+        <p:sp>
+          <p:nvSpPr>
+            <p:cNvPr id="27" name="TextBox 26"/>
+            <p:cNvSpPr txBox="1"/>
+            <p:nvPr/>
+          </p:nvSpPr>
+          <p:spPr>
+            <a:xfrm>
+              <a:off x="313749" y="2815372"/>
+              <a:ext cx="990464" cy="646331"/>
+            </a:xfrm>
+            <a:prstGeom prst="rect">
+              <a:avLst/>
+            </a:prstGeom>
+            <a:noFill/>
+          </p:spPr>
+          <p:txBody>
+            <a:bodyPr wrap="none" rtlCol="0">
+              <a:spAutoFit/>
+            </a:bodyPr>
+            <a:lstStyle/>
+            <a:p>
+              <a:r>
+                <a:rPr lang="en-US" sz="1200" dirty="0" smtClean="0"/>
+                <a:t>Embryo</a:t>
+              </a:r>
+            </a:p>
+            <a:p>
+              <a:r>
+                <a:rPr lang="en-US" sz="1200" dirty="0" err="1" smtClean="0"/>
+                <a:t>Gro</a:t>
+              </a:r>
+              <a:r>
+                <a:rPr lang="en-US" sz="1200" dirty="0" smtClean="0"/>
+                <a:t> ChIP-seq</a:t>
+              </a:r>
+            </a:p>
+            <a:p>
+              <a:r>
+                <a:rPr lang="en-US" sz="1200" dirty="0" smtClean="0"/>
+                <a:t>All Peaks</a:t>
+              </a:r>
+              <a:endParaRPr lang="en-US" sz="1200" dirty="0"/>
+            </a:p>
+          </p:txBody>
+        </p:sp>
+        <p:sp>
+          <p:nvSpPr>
+            <p:cNvPr id="28" name="TextBox 27"/>
+            <p:cNvSpPr txBox="1"/>
+            <p:nvPr/>
+          </p:nvSpPr>
+          <p:spPr>
+            <a:xfrm>
+              <a:off x="4300017" y="2815372"/>
+              <a:ext cx="1033745" cy="646331"/>
+            </a:xfrm>
+            <a:prstGeom prst="rect">
+              <a:avLst/>
+            </a:prstGeom>
+            <a:noFill/>
+          </p:spPr>
+          <p:txBody>
+            <a:bodyPr wrap="none" rtlCol="0">
+              <a:spAutoFit/>
+            </a:bodyPr>
+            <a:lstStyle/>
+            <a:p>
+              <a:r>
+                <a:rPr lang="en-US" sz="1200" dirty="0" err="1" smtClean="0"/>
+                <a:t>modENCODE</a:t>
+              </a:r>
+              <a:endParaRPr lang="en-US" sz="1200" dirty="0" smtClean="0"/>
+            </a:p>
+            <a:p>
+              <a:r>
+                <a:rPr lang="en-US" sz="1200" dirty="0" smtClean="0"/>
+                <a:t>Embryo</a:t>
+              </a:r>
+            </a:p>
+            <a:p>
+              <a:r>
+                <a:rPr lang="en-US" sz="1200" dirty="0" err="1" smtClean="0"/>
+                <a:t>Gro</a:t>
+              </a:r>
+              <a:r>
+                <a:rPr lang="en-US" sz="1200" dirty="0" smtClean="0"/>
+                <a:t> </a:t>
+              </a:r>
+              <a:r>
+                <a:rPr lang="en-US" sz="1200" dirty="0" err="1" smtClean="0"/>
+                <a:t>ChIP</a:t>
+              </a:r>
+              <a:r>
+                <a:rPr lang="en-US" sz="1200" dirty="0" smtClean="0"/>
+                <a:t>-chip</a:t>
+              </a:r>
+              <a:endParaRPr lang="en-US" sz="1200" dirty="0"/>
+            </a:p>
+          </p:txBody>
+        </p:sp>
+      </p:grpSp>
+    </p:spTree>
+    <p:extLst>
+      <p:ext uri="{BB962C8B-B14F-4D97-AF65-F5344CB8AC3E}">
+        <p14:creationId xmlns:p14="http://schemas.microsoft.com/office/powerpoint/2010/main" val="1205753558"/>
+      </p:ext>
+    </p:extLst>
+  </p:cSld>
+  <p:clrMapOvr>
+    <a:masterClrMapping/>
+  </p:clrMapOvr>
+  <p:timing>
+    <p:tnLst>
+      <p:par>
+        <p:cTn id="1" dur="indefinite" restart="never" nodeType="tmRoot"/>
+      </p:par>
+    </p:tnLst>
+  </p:timing>
+</p:sld>
+</file>
+
+<file path=ppt/slides/slide12.xml><?xml version="1.0" encoding="utf-8"?>
+<p:sld xmlns:a="http://schemas.openxmlformats.org/drawingml/2006/main" xmlns:r="http://schemas.openxmlformats.org/officeDocument/2006/relationships" xmlns:p="http://schemas.openxmlformats.org/presentationml/2006/main">
+  <p:cSld>
+    <p:spTree>
+      <p:nvGrpSpPr>
+        <p:cNvPr id="1" name=""/>
+        <p:cNvGrpSpPr/>
+        <p:nvPr/>
+      </p:nvGrpSpPr>
+      <p:grpSpPr>
+        <a:xfrm>
+          <a:off x="0" y="0"/>
+          <a:ext cx="0" cy="0"/>
+          <a:chOff x="0" y="0"/>
+          <a:chExt cx="0" cy="0"/>
+        </a:xfrm>
+      </p:grpSpPr>
+      <p:sp>
+        <p:nvSpPr>
+          <p:cNvPr id="5" name="TextBox 4"/>
+          <p:cNvSpPr txBox="1"/>
+          <p:nvPr/>
+        </p:nvSpPr>
+        <p:spPr>
+          <a:xfrm>
+            <a:off x="1641353" y="4748587"/>
+            <a:ext cx="4881489" cy="646331"/>
+          </a:xfrm>
+          <a:prstGeom prst="rect">
+            <a:avLst/>
+          </a:prstGeom>
+          <a:solidFill>
+            <a:schemeClr val="bg1"/>
+          </a:solidFill>
+        </p:spPr>
+        <p:txBody>
+          <a:bodyPr wrap="square" rtlCol="0">
+            <a:spAutoFit/>
+          </a:bodyPr>
+          <a:lstStyle/>
+          <a:p>
+            <a:pPr algn="ctr"/>
+            <a:r>
+              <a:rPr lang="en-US" dirty="0"/>
+              <a:t>p</a:t>
+            </a:r>
+            <a:r>
+              <a:rPr lang="en-US" dirty="0" smtClean="0"/>
+              <a:t>oly(A)+ mRNA</a:t>
+            </a:r>
+          </a:p>
+          <a:p>
+            <a:pPr algn="ctr"/>
+            <a:r>
+              <a:rPr lang="en-US" dirty="0" smtClean="0"/>
+              <a:t>Normalized Expression Level </a:t>
+            </a:r>
+            <a:r>
+              <a:rPr lang="en-US" dirty="0" smtClean="0"/>
+              <a:t>(</a:t>
+            </a:r>
+            <a:r>
+              <a:rPr lang="en-US" dirty="0" smtClean="0"/>
+              <a:t>log</a:t>
+            </a:r>
+            <a:r>
+              <a:rPr lang="en-US" baseline="-25000" dirty="0" smtClean="0"/>
+              <a:t>2</a:t>
+            </a:r>
+            <a:r>
+              <a:rPr lang="en-US" dirty="0" smtClean="0"/>
+              <a:t>FPM</a:t>
+            </a:r>
+            <a:r>
+              <a:rPr lang="en-US" dirty="0" smtClean="0"/>
+              <a:t>)</a:t>
+            </a:r>
+            <a:endParaRPr lang="en-US" dirty="0"/>
+          </a:p>
+        </p:txBody>
+      </p:sp>
+      <p:sp>
+        <p:nvSpPr>
+          <p:cNvPr id="6" name="TextBox 5"/>
+          <p:cNvSpPr txBox="1"/>
+          <p:nvPr/>
+        </p:nvSpPr>
+        <p:spPr>
+          <a:xfrm rot="16200000">
+            <a:off x="-1596464" y="2390236"/>
+            <a:ext cx="4881489" cy="646331"/>
+          </a:xfrm>
+          <a:prstGeom prst="rect">
+            <a:avLst/>
+          </a:prstGeom>
+          <a:solidFill>
+            <a:schemeClr val="bg1"/>
+          </a:solidFill>
+        </p:spPr>
+        <p:txBody>
+          <a:bodyPr wrap="square" rtlCol="0">
+            <a:spAutoFit/>
+          </a:bodyPr>
+          <a:lstStyle/>
+          <a:p>
+            <a:pPr algn="ctr"/>
+            <a:r>
+              <a:rPr lang="en-US" dirty="0" smtClean="0"/>
+              <a:t>Nascent RNA</a:t>
+            </a:r>
+          </a:p>
+          <a:p>
+            <a:pPr algn="ctr"/>
+            <a:r>
+              <a:rPr lang="en-US" dirty="0" smtClean="0"/>
+              <a:t>Normalized Expression Level </a:t>
+            </a:r>
+            <a:r>
+              <a:rPr lang="en-US" dirty="0" smtClean="0"/>
+              <a:t>(log</a:t>
+            </a:r>
+            <a:r>
+              <a:rPr lang="en-US" baseline="-25000" dirty="0" smtClean="0"/>
+              <a:t>2</a:t>
+            </a:r>
+            <a:r>
+              <a:rPr lang="en-US" dirty="0" smtClean="0"/>
+              <a:t>FPM)</a:t>
+            </a:r>
+            <a:endParaRPr lang="en-US" dirty="0"/>
+          </a:p>
+        </p:txBody>
+      </p:sp>
+      <p:pic>
+        <p:nvPicPr>
+          <p:cNvPr id="8" name="Picture 7"/>
+          <p:cNvPicPr>
+            <a:picLocks noChangeAspect="1"/>
+          </p:cNvPicPr>
+          <p:nvPr/>
+        </p:nvPicPr>
+        <p:blipFill rotWithShape="1">
+          <a:blip r:embed="rId2">
+            <a:extLst>
+              <a:ext uri="{28A0092B-C50C-407E-A947-70E740481C1C}">
+                <a14:useLocalDpi xmlns:a14="http://schemas.microsoft.com/office/drawing/2010/main" val="0"/>
+              </a:ext>
+            </a:extLst>
+          </a:blip>
+          <a:srcRect l="3439" r="10820" b="6631"/>
+          <a:stretch/>
+        </p:blipFill>
+        <p:spPr>
+          <a:xfrm>
+            <a:off x="1167447" y="1001335"/>
+            <a:ext cx="5830761" cy="3692586"/>
+          </a:xfrm>
+          <a:prstGeom prst="rect">
+            <a:avLst/>
+          </a:prstGeom>
+        </p:spPr>
+      </p:pic>
+    </p:spTree>
+    <p:extLst>
+      <p:ext uri="{BB962C8B-B14F-4D97-AF65-F5344CB8AC3E}">
+        <p14:creationId xmlns:p14="http://schemas.microsoft.com/office/powerpoint/2010/main" val="1918597903"/>
+      </p:ext>
+    </p:extLst>
+  </p:cSld>
+  <p:clrMapOvr>
+    <a:masterClrMapping/>
+  </p:clrMapOvr>
+</p:sld>
+</file>
+
+<file path=ppt/slides/slide13.xml><?xml version="1.0" encoding="utf-8"?>
+<p:sld xmlns:a="http://schemas.openxmlformats.org/drawingml/2006/main" xmlns:r="http://schemas.openxmlformats.org/officeDocument/2006/relationships" xmlns:p="http://schemas.openxmlformats.org/presentationml/2006/main">
+  <p:cSld>
+    <p:spTree>
+      <p:nvGrpSpPr>
+        <p:cNvPr id="1" name=""/>
+        <p:cNvGrpSpPr/>
+        <p:nvPr/>
+      </p:nvGrpSpPr>
+      <p:grpSpPr>
+        <a:xfrm>
+          <a:off x="0" y="0"/>
+          <a:ext cx="0" cy="0"/>
+          <a:chOff x="0" y="0"/>
+          <a:chExt cx="0" cy="0"/>
+        </a:xfrm>
+      </p:grpSpPr>
+      <p:pic>
+        <p:nvPicPr>
+          <p:cNvPr id="2" name="Picture 1"/>
+          <p:cNvPicPr>
+            <a:picLocks noChangeAspect="1"/>
+          </p:cNvPicPr>
+          <p:nvPr/>
+        </p:nvPicPr>
+        <p:blipFill>
+          <a:blip r:embed="rId2">
+            <a:extLst>
+              <a:ext uri="{28A0092B-C50C-407E-A947-70E740481C1C}">
+                <a14:useLocalDpi xmlns:a14="http://schemas.microsoft.com/office/drawing/2010/main" val="0"/>
+              </a:ext>
+            </a:extLst>
+          </a:blip>
+          <a:stretch>
+            <a:fillRect/>
+          </a:stretch>
+        </p:blipFill>
+        <p:spPr>
+          <a:xfrm>
+            <a:off x="5984045" y="2055479"/>
+            <a:ext cx="1551256" cy="1472711"/>
+          </a:xfrm>
+          <a:prstGeom prst="rect">
+            <a:avLst/>
+          </a:prstGeom>
+        </p:spPr>
+      </p:pic>
+      <p:pic>
+        <p:nvPicPr>
+          <p:cNvPr id="3" name="Picture 2"/>
+          <p:cNvPicPr>
+            <a:picLocks noChangeAspect="1"/>
+          </p:cNvPicPr>
+          <p:nvPr/>
+        </p:nvPicPr>
+        <p:blipFill>
+          <a:blip r:embed="rId3">
+            <a:extLst>
+              <a:ext uri="{28A0092B-C50C-407E-A947-70E740481C1C}">
+                <a14:useLocalDpi xmlns:a14="http://schemas.microsoft.com/office/drawing/2010/main" val="0"/>
+              </a:ext>
+            </a:extLst>
+          </a:blip>
+          <a:stretch>
+            <a:fillRect/>
+          </a:stretch>
+        </p:blipFill>
+        <p:spPr>
+          <a:xfrm>
+            <a:off x="5984045" y="3528190"/>
+            <a:ext cx="1580727" cy="1495072"/>
+          </a:xfrm>
+          <a:prstGeom prst="rect">
+            <a:avLst/>
+          </a:prstGeom>
+        </p:spPr>
+      </p:pic>
+      <p:pic>
+        <p:nvPicPr>
+          <p:cNvPr id="4" name="Picture 3"/>
+          <p:cNvPicPr>
+            <a:picLocks noChangeAspect="1"/>
+          </p:cNvPicPr>
+          <p:nvPr/>
+        </p:nvPicPr>
+        <p:blipFill>
+          <a:blip r:embed="rId4">
+            <a:extLst>
+              <a:ext uri="{28A0092B-C50C-407E-A947-70E740481C1C}">
+                <a14:useLocalDpi xmlns:a14="http://schemas.microsoft.com/office/drawing/2010/main" val="0"/>
+              </a:ext>
+            </a:extLst>
+          </a:blip>
+          <a:stretch>
+            <a:fillRect/>
+          </a:stretch>
+        </p:blipFill>
+        <p:spPr>
+          <a:xfrm>
+            <a:off x="5817790" y="4899783"/>
+            <a:ext cx="2031799" cy="1716954"/>
+          </a:xfrm>
+          <a:prstGeom prst="rect">
+            <a:avLst/>
+          </a:prstGeom>
+        </p:spPr>
+      </p:pic>
+    </p:spTree>
+    <p:extLst>
+      <p:ext uri="{BB962C8B-B14F-4D97-AF65-F5344CB8AC3E}">
+        <p14:creationId xmlns:p14="http://schemas.microsoft.com/office/powerpoint/2010/main" val="750383954"/>
+      </p:ext>
+    </p:extLst>
+  </p:cSld>
+  <p:clrMapOvr>
+    <a:masterClrMapping/>
+  </p:clrMapOvr>
+</p:sld>
+</file>
+
+<file path=ppt/slides/slide14.xml><?xml version="1.0" encoding="utf-8"?>
+<p:sld xmlns:a="http://schemas.openxmlformats.org/drawingml/2006/main" xmlns:r="http://schemas.openxmlformats.org/officeDocument/2006/relationships" xmlns:p="http://schemas.openxmlformats.org/presentationml/2006/main">
+  <p:cSld>
+    <p:spTree>
+      <p:nvGrpSpPr>
+        <p:cNvPr id="1" name=""/>
+        <p:cNvGrpSpPr/>
+        <p:nvPr/>
+      </p:nvGrpSpPr>
+      <p:grpSpPr>
+        <a:xfrm>
+          <a:off x="0" y="0"/>
+          <a:ext cx="0" cy="0"/>
+          <a:chOff x="0" y="0"/>
+          <a:chExt cx="0" cy="0"/>
+        </a:xfrm>
+      </p:grpSpPr>
+      <p:pic>
+        <p:nvPicPr>
+          <p:cNvPr id="7" name="Picture 6"/>
+          <p:cNvPicPr>
+            <a:picLocks noChangeAspect="1"/>
+          </p:cNvPicPr>
+          <p:nvPr/>
+        </p:nvPicPr>
+        <p:blipFill rotWithShape="1">
+          <a:blip r:embed="rId2">
+            <a:extLst>
+              <a:ext uri="{28A0092B-C50C-407E-A947-70E740481C1C}">
+                <a14:useLocalDpi xmlns:a14="http://schemas.microsoft.com/office/drawing/2010/main" val="0"/>
+              </a:ext>
+            </a:extLst>
+          </a:blip>
+          <a:srcRect l="30353" t="17172" r="29912" b="15862"/>
+          <a:stretch/>
+        </p:blipFill>
+        <p:spPr>
+          <a:xfrm>
+            <a:off x="4504944" y="1133856"/>
+            <a:ext cx="1374668" cy="1365504"/>
+          </a:xfrm>
+          <a:prstGeom prst="rect">
+            <a:avLst/>
+          </a:prstGeom>
+        </p:spPr>
+      </p:pic>
+      <p:pic>
+        <p:nvPicPr>
+          <p:cNvPr id="8" name="Picture 7"/>
+          <p:cNvPicPr>
+            <a:picLocks noChangeAspect="1"/>
+          </p:cNvPicPr>
+          <p:nvPr/>
+        </p:nvPicPr>
+        <p:blipFill rotWithShape="1">
+          <a:blip r:embed="rId3">
+            <a:extLst>
+              <a:ext uri="{28A0092B-C50C-407E-A947-70E740481C1C}">
+                <a14:useLocalDpi xmlns:a14="http://schemas.microsoft.com/office/drawing/2010/main" val="0"/>
+              </a:ext>
+            </a:extLst>
+          </a:blip>
+          <a:srcRect l="30128" t="15375" r="30084" b="15861"/>
+          <a:stretch/>
+        </p:blipFill>
+        <p:spPr>
+          <a:xfrm>
+            <a:off x="4504944" y="2450592"/>
+            <a:ext cx="1374669" cy="1402162"/>
+          </a:xfrm>
+          <a:prstGeom prst="rect">
+            <a:avLst/>
+          </a:prstGeom>
+        </p:spPr>
+      </p:pic>
+      <p:pic>
+        <p:nvPicPr>
+          <p:cNvPr id="9" name="Picture 8"/>
+          <p:cNvPicPr>
+            <a:picLocks noChangeAspect="1"/>
+          </p:cNvPicPr>
+          <p:nvPr/>
+        </p:nvPicPr>
+        <p:blipFill rotWithShape="1">
+          <a:blip r:embed="rId4">
+            <a:extLst>
+              <a:ext uri="{28A0092B-C50C-407E-A947-70E740481C1C}">
+                <a14:useLocalDpi xmlns:a14="http://schemas.microsoft.com/office/drawing/2010/main" val="0"/>
+              </a:ext>
+            </a:extLst>
+          </a:blip>
+          <a:srcRect l="29824" t="17397" r="30442" b="15637"/>
+          <a:stretch/>
+        </p:blipFill>
+        <p:spPr>
+          <a:xfrm>
+            <a:off x="4504944" y="3852754"/>
+            <a:ext cx="1374668" cy="1365504"/>
+          </a:xfrm>
+          <a:prstGeom prst="rect">
+            <a:avLst/>
+          </a:prstGeom>
+        </p:spPr>
+      </p:pic>
+    </p:spTree>
+    <p:extLst>
+      <p:ext uri="{BB962C8B-B14F-4D97-AF65-F5344CB8AC3E}">
+        <p14:creationId xmlns:p14="http://schemas.microsoft.com/office/powerpoint/2010/main" val="277967301"/>
+      </p:ext>
+    </p:extLst>
+  </p:cSld>
+  <p:clrMapOvr>
+    <a:masterClrMapping/>
+  </p:clrMapOvr>
+</p:sld>
+</file>
+
+<file path=ppt/slides/slide15.xml><?xml version="1.0" encoding="utf-8"?>
+<p:sld xmlns:a="http://schemas.openxmlformats.org/drawingml/2006/main" xmlns:r="http://schemas.openxmlformats.org/officeDocument/2006/relationships" xmlns:p="http://schemas.openxmlformats.org/presentationml/2006/main">
+  <p:cSld>
+    <p:spTree>
+      <p:nvGrpSpPr>
+        <p:cNvPr id="1" name=""/>
+        <p:cNvGrpSpPr/>
+        <p:nvPr/>
+      </p:nvGrpSpPr>
+      <p:grpSpPr>
+        <a:xfrm>
+          <a:off x="0" y="0"/>
+          <a:ext cx="0" cy="0"/>
+          <a:chOff x="0" y="0"/>
+          <a:chExt cx="0" cy="0"/>
+        </a:xfrm>
+      </p:grpSpPr>
+      <p:pic>
+        <p:nvPicPr>
+          <p:cNvPr id="2" name="Picture 1"/>
+          <p:cNvPicPr>
+            <a:picLocks noChangeAspect="1"/>
+          </p:cNvPicPr>
+          <p:nvPr/>
+        </p:nvPicPr>
+        <p:blipFill rotWithShape="1">
+          <a:blip r:embed="rId2">
+            <a:extLst>
+              <a:ext uri="{28A0092B-C50C-407E-A947-70E740481C1C}">
+                <a14:useLocalDpi xmlns:a14="http://schemas.microsoft.com/office/drawing/2010/main" val="0"/>
+              </a:ext>
+            </a:extLst>
+          </a:blip>
+          <a:srcRect l="20357" t="3669" r="19803" b="3411"/>
+          <a:stretch/>
+        </p:blipFill>
+        <p:spPr>
+          <a:xfrm>
+            <a:off x="1780032" y="877010"/>
+            <a:ext cx="1816608" cy="1695501"/>
+          </a:xfrm>
+          <a:prstGeom prst="rect">
+            <a:avLst/>
+          </a:prstGeom>
+        </p:spPr>
+      </p:pic>
+      <p:pic>
+        <p:nvPicPr>
+          <p:cNvPr id="3" name="Picture 2"/>
+          <p:cNvPicPr>
+            <a:picLocks noChangeAspect="1"/>
+          </p:cNvPicPr>
+          <p:nvPr/>
+        </p:nvPicPr>
+        <p:blipFill rotWithShape="1">
+          <a:blip r:embed="rId3">
+            <a:extLst>
+              <a:ext uri="{28A0092B-C50C-407E-A947-70E740481C1C}">
+                <a14:useLocalDpi xmlns:a14="http://schemas.microsoft.com/office/drawing/2010/main" val="0"/>
+              </a:ext>
+            </a:extLst>
+          </a:blip>
+          <a:srcRect l="20091" t="3669" r="20069" b="3411"/>
+          <a:stretch/>
+        </p:blipFill>
+        <p:spPr>
+          <a:xfrm>
+            <a:off x="1780032" y="2572511"/>
+            <a:ext cx="1816608" cy="1695501"/>
+          </a:xfrm>
+          <a:prstGeom prst="rect">
+            <a:avLst/>
+          </a:prstGeom>
+        </p:spPr>
+      </p:pic>
+      <p:pic>
+        <p:nvPicPr>
+          <p:cNvPr id="4" name="Picture 3"/>
+          <p:cNvPicPr>
+            <a:picLocks noChangeAspect="1"/>
+          </p:cNvPicPr>
+          <p:nvPr/>
+        </p:nvPicPr>
+        <p:blipFill rotWithShape="1">
+          <a:blip r:embed="rId4">
+            <a:extLst>
+              <a:ext uri="{28A0092B-C50C-407E-A947-70E740481C1C}">
+                <a14:useLocalDpi xmlns:a14="http://schemas.microsoft.com/office/drawing/2010/main" val="0"/>
+              </a:ext>
+            </a:extLst>
+          </a:blip>
+          <a:srcRect l="20091" t="3226" r="20069" b="3853"/>
+          <a:stretch/>
+        </p:blipFill>
+        <p:spPr>
+          <a:xfrm>
+            <a:off x="1780032" y="4268012"/>
+            <a:ext cx="1816608" cy="1695501"/>
+          </a:xfrm>
+          <a:prstGeom prst="rect">
+            <a:avLst/>
+          </a:prstGeom>
+        </p:spPr>
+      </p:pic>
+    </p:spTree>
+    <p:extLst>
+      <p:ext uri="{BB962C8B-B14F-4D97-AF65-F5344CB8AC3E}">
+        <p14:creationId xmlns:p14="http://schemas.microsoft.com/office/powerpoint/2010/main" val="1474262147"/>
+      </p:ext>
+    </p:extLst>
+  </p:cSld>
+  <p:clrMapOvr>
+    <a:masterClrMapping/>
+  </p:clrMapOvr>
+</p:sld>
+</file>
+
+<file path=ppt/slides/slide16.xml><?xml version="1.0" encoding="utf-8"?>
+<p:sld xmlns:a="http://schemas.openxmlformats.org/drawingml/2006/main" xmlns:r="http://schemas.openxmlformats.org/officeDocument/2006/relationships" xmlns:p="http://schemas.openxmlformats.org/presentationml/2006/main">
+  <p:cSld>
+    <p:spTree>
+      <p:nvGrpSpPr>
+        <p:cNvPr id="1" name=""/>
+        <p:cNvGrpSpPr/>
+        <p:nvPr/>
+      </p:nvGrpSpPr>
+      <p:grpSpPr>
+        <a:xfrm>
+          <a:off x="0" y="0"/>
+          <a:ext cx="0" cy="0"/>
+          <a:chOff x="0" y="0"/>
+          <a:chExt cx="0" cy="0"/>
+        </a:xfrm>
+      </p:grpSpPr>
+      <p:pic>
+        <p:nvPicPr>
+          <p:cNvPr id="2" name="Picture 1"/>
+          <p:cNvPicPr>
+            <a:picLocks noChangeAspect="1"/>
+          </p:cNvPicPr>
+          <p:nvPr/>
+        </p:nvPicPr>
+        <p:blipFill rotWithShape="1">
+          <a:blip r:embed="rId2">
+            <a:extLst>
+              <a:ext uri="{28A0092B-C50C-407E-A947-70E740481C1C}">
+                <a14:useLocalDpi xmlns:a14="http://schemas.microsoft.com/office/drawing/2010/main" val="0"/>
+              </a:ext>
+            </a:extLst>
+          </a:blip>
+          <a:srcRect l="28125" t="20313" r="24777" b="29018"/>
+          <a:stretch/>
+        </p:blipFill>
+        <p:spPr>
+          <a:xfrm>
+            <a:off x="285749" y="542926"/>
+            <a:ext cx="3014663" cy="3243262"/>
+          </a:xfrm>
+          <a:prstGeom prst="rect">
+            <a:avLst/>
+          </a:prstGeom>
+        </p:spPr>
+      </p:pic>
+      <p:pic>
+        <p:nvPicPr>
+          <p:cNvPr id="3" name="Picture 2"/>
+          <p:cNvPicPr>
+            <a:picLocks noChangeAspect="1"/>
+          </p:cNvPicPr>
+          <p:nvPr/>
+        </p:nvPicPr>
+        <p:blipFill rotWithShape="1">
+          <a:blip r:embed="rId3">
+            <a:extLst>
+              <a:ext uri="{28A0092B-C50C-407E-A947-70E740481C1C}">
+                <a14:useLocalDpi xmlns:a14="http://schemas.microsoft.com/office/drawing/2010/main" val="0"/>
+              </a:ext>
+            </a:extLst>
+          </a:blip>
+          <a:srcRect l="26116" t="20089" r="24777" b="29018"/>
+          <a:stretch/>
+        </p:blipFill>
+        <p:spPr>
+          <a:xfrm>
+            <a:off x="221455" y="228601"/>
+            <a:ext cx="3143250" cy="3257550"/>
+          </a:xfrm>
+          <a:prstGeom prst="rect">
+            <a:avLst/>
+          </a:prstGeom>
+        </p:spPr>
+      </p:pic>
+      <p:grpSp>
+        <p:nvGrpSpPr>
+          <p:cNvPr id="12" name="Group 11"/>
+          <p:cNvGrpSpPr/>
+          <p:nvPr/>
+        </p:nvGrpSpPr>
+        <p:grpSpPr>
+          <a:xfrm>
+            <a:off x="3914775" y="3308983"/>
+            <a:ext cx="1824609" cy="2734630"/>
+            <a:chOff x="3914775" y="3308983"/>
+            <a:chExt cx="1824609" cy="2734630"/>
+          </a:xfrm>
+        </p:grpSpPr>
+        <p:pic>
+          <p:nvPicPr>
+            <p:cNvPr id="4" name="Picture 3"/>
+            <p:cNvPicPr>
+              <a:picLocks noChangeAspect="1"/>
+            </p:cNvPicPr>
+            <p:nvPr/>
+          </p:nvPicPr>
+          <p:blipFill rotWithShape="1">
+            <a:blip r:embed="rId4">
+              <a:extLst>
+                <a:ext uri="{28A0092B-C50C-407E-A947-70E740481C1C}">
+                  <a14:useLocalDpi xmlns:a14="http://schemas.microsoft.com/office/drawing/2010/main" val="0"/>
+                </a:ext>
+              </a:extLst>
+            </a:blip>
+            <a:srcRect l="75001" t="29241" r="20534" b="44866"/>
+            <a:stretch/>
+          </p:blipFill>
+          <p:spPr>
+            <a:xfrm>
+              <a:off x="3914775" y="3308983"/>
+              <a:ext cx="471488" cy="2734630"/>
+            </a:xfrm>
+            <a:prstGeom prst="rect">
+              <a:avLst/>
+            </a:prstGeom>
+          </p:spPr>
+        </p:pic>
+        <p:sp>
+          <p:nvSpPr>
+            <p:cNvPr id="5" name="TextBox 4"/>
+            <p:cNvSpPr txBox="1"/>
+            <p:nvPr/>
+          </p:nvSpPr>
+          <p:spPr>
+            <a:xfrm>
+              <a:off x="4269302" y="3389414"/>
+              <a:ext cx="652743" cy="307777"/>
+            </a:xfrm>
+            <a:prstGeom prst="rect">
+              <a:avLst/>
+            </a:prstGeom>
+            <a:noFill/>
+          </p:spPr>
+          <p:txBody>
+            <a:bodyPr wrap="none" rtlCol="0">
+              <a:spAutoFit/>
+            </a:bodyPr>
+            <a:lstStyle/>
+            <a:p>
+              <a:r>
+                <a:rPr lang="en-US" sz="1400" smtClean="0">
+                  <a:latin typeface="Helvetica Neue" charset="0"/>
+                  <a:ea typeface="Helvetica Neue" charset="0"/>
+                  <a:cs typeface="Helvetica Neue" charset="0"/>
+                </a:rPr>
+                <a:t>Genic</a:t>
+              </a:r>
+              <a:endParaRPr lang="en-US" sz="1400">
+                <a:latin typeface="Helvetica Neue" charset="0"/>
+                <a:ea typeface="Helvetica Neue" charset="0"/>
+                <a:cs typeface="Helvetica Neue" charset="0"/>
+              </a:endParaRPr>
+            </a:p>
+          </p:txBody>
+        </p:sp>
+        <p:sp>
+          <p:nvSpPr>
+            <p:cNvPr id="6" name="TextBox 5"/>
+            <p:cNvSpPr txBox="1"/>
+            <p:nvPr/>
+          </p:nvSpPr>
+          <p:spPr>
+            <a:xfrm>
+              <a:off x="4269302" y="3752182"/>
+              <a:ext cx="971548" cy="307777"/>
+            </a:xfrm>
+            <a:prstGeom prst="rect">
+              <a:avLst/>
+            </a:prstGeom>
+            <a:noFill/>
+          </p:spPr>
+          <p:txBody>
+            <a:bodyPr wrap="none" rtlCol="0">
+              <a:spAutoFit/>
+            </a:bodyPr>
+            <a:lstStyle/>
+            <a:p>
+              <a:r>
+                <a:rPr lang="en-US" sz="1400" dirty="0" err="1" smtClean="0">
+                  <a:latin typeface="Helvetica Neue" charset="0"/>
+                  <a:ea typeface="Helvetica Neue" charset="0"/>
+                  <a:cs typeface="Helvetica Neue" charset="0"/>
+                </a:rPr>
+                <a:t>Intergenic</a:t>
+              </a:r>
+              <a:endParaRPr lang="en-US" sz="1400" dirty="0">
+                <a:latin typeface="Helvetica Neue" charset="0"/>
+                <a:ea typeface="Helvetica Neue" charset="0"/>
+                <a:cs typeface="Helvetica Neue" charset="0"/>
+              </a:endParaRPr>
+            </a:p>
+          </p:txBody>
+        </p:sp>
+        <p:sp>
+          <p:nvSpPr>
+            <p:cNvPr id="7" name="TextBox 6"/>
+            <p:cNvSpPr txBox="1"/>
+            <p:nvPr/>
+          </p:nvSpPr>
+          <p:spPr>
+            <a:xfrm>
+              <a:off x="4269302" y="4114950"/>
+              <a:ext cx="644728" cy="307777"/>
+            </a:xfrm>
+            <a:prstGeom prst="rect">
+              <a:avLst/>
+            </a:prstGeom>
+            <a:noFill/>
+          </p:spPr>
+          <p:txBody>
+            <a:bodyPr wrap="none" rtlCol="0">
+              <a:spAutoFit/>
+            </a:bodyPr>
+            <a:lstStyle/>
+            <a:p>
+              <a:r>
+                <a:rPr lang="en-US" sz="1400" dirty="0" smtClean="0">
+                  <a:latin typeface="Helvetica Neue" charset="0"/>
+                  <a:ea typeface="Helvetica Neue" charset="0"/>
+                  <a:cs typeface="Helvetica Neue" charset="0"/>
+                </a:rPr>
+                <a:t>Intron</a:t>
+              </a:r>
+              <a:endParaRPr lang="en-US" sz="1400" dirty="0">
+                <a:latin typeface="Helvetica Neue" charset="0"/>
+                <a:ea typeface="Helvetica Neue" charset="0"/>
+                <a:cs typeface="Helvetica Neue" charset="0"/>
+              </a:endParaRPr>
+            </a:p>
+          </p:txBody>
+        </p:sp>
+        <p:sp>
+          <p:nvSpPr>
+            <p:cNvPr id="8" name="TextBox 7"/>
+            <p:cNvSpPr txBox="1"/>
+            <p:nvPr/>
+          </p:nvSpPr>
+          <p:spPr>
+            <a:xfrm>
+              <a:off x="4269302" y="4477718"/>
+              <a:ext cx="588623" cy="307777"/>
+            </a:xfrm>
+            <a:prstGeom prst="rect">
+              <a:avLst/>
+            </a:prstGeom>
+            <a:noFill/>
+          </p:spPr>
+          <p:txBody>
+            <a:bodyPr wrap="none" rtlCol="0">
+              <a:spAutoFit/>
+            </a:bodyPr>
+            <a:lstStyle/>
+            <a:p>
+              <a:r>
+                <a:rPr lang="en-US" sz="1400" dirty="0" smtClean="0">
+                  <a:latin typeface="Helvetica Neue" charset="0"/>
+                  <a:ea typeface="Helvetica Neue" charset="0"/>
+                  <a:cs typeface="Helvetica Neue" charset="0"/>
+                </a:rPr>
+                <a:t>Exon</a:t>
+              </a:r>
+              <a:endParaRPr lang="en-US" sz="1400" dirty="0">
+                <a:latin typeface="Helvetica Neue" charset="0"/>
+                <a:ea typeface="Helvetica Neue" charset="0"/>
+                <a:cs typeface="Helvetica Neue" charset="0"/>
+              </a:endParaRPr>
+            </a:p>
+          </p:txBody>
+        </p:sp>
+        <p:sp>
+          <p:nvSpPr>
+            <p:cNvPr id="9" name="TextBox 8"/>
+            <p:cNvSpPr txBox="1"/>
+            <p:nvPr/>
+          </p:nvSpPr>
+          <p:spPr>
+            <a:xfrm>
+              <a:off x="4269302" y="4840486"/>
+              <a:ext cx="968535" cy="307777"/>
+            </a:xfrm>
+            <a:prstGeom prst="rect">
+              <a:avLst/>
+            </a:prstGeom>
+            <a:noFill/>
+          </p:spPr>
+          <p:txBody>
+            <a:bodyPr wrap="none" rtlCol="0">
+              <a:spAutoFit/>
+            </a:bodyPr>
+            <a:lstStyle/>
+            <a:p>
+              <a:r>
+                <a:rPr lang="en-US" sz="1400" dirty="0" smtClean="0">
+                  <a:latin typeface="Helvetica Neue" charset="0"/>
+                  <a:ea typeface="Helvetica Neue" charset="0"/>
+                  <a:cs typeface="Helvetica Neue" charset="0"/>
+                </a:rPr>
+                <a:t>Upstream</a:t>
+              </a:r>
+              <a:endParaRPr lang="en-US" sz="1400" dirty="0">
+                <a:latin typeface="Helvetica Neue" charset="0"/>
+                <a:ea typeface="Helvetica Neue" charset="0"/>
+                <a:cs typeface="Helvetica Neue" charset="0"/>
+              </a:endParaRPr>
+            </a:p>
+          </p:txBody>
+        </p:sp>
+        <p:sp>
+          <p:nvSpPr>
+            <p:cNvPr id="10" name="TextBox 9"/>
+            <p:cNvSpPr txBox="1"/>
+            <p:nvPr/>
+          </p:nvSpPr>
+          <p:spPr>
+            <a:xfrm>
+              <a:off x="4269302" y="5203254"/>
+              <a:ext cx="1197764" cy="307777"/>
+            </a:xfrm>
+            <a:prstGeom prst="rect">
+              <a:avLst/>
+            </a:prstGeom>
+            <a:noFill/>
+          </p:spPr>
+          <p:txBody>
+            <a:bodyPr wrap="none" rtlCol="0">
+              <a:spAutoFit/>
+            </a:bodyPr>
+            <a:lstStyle/>
+            <a:p>
+              <a:r>
+                <a:rPr lang="en-US" sz="1400" dirty="0" smtClean="0">
+                  <a:latin typeface="Helvetica Neue" charset="0"/>
+                  <a:ea typeface="Helvetica Neue" charset="0"/>
+                  <a:cs typeface="Helvetica Neue" charset="0"/>
+                </a:rPr>
+                <a:t>Downstream</a:t>
+              </a:r>
+              <a:endParaRPr lang="en-US" sz="1400" dirty="0">
+                <a:latin typeface="Helvetica Neue" charset="0"/>
+                <a:ea typeface="Helvetica Neue" charset="0"/>
+                <a:cs typeface="Helvetica Neue" charset="0"/>
+              </a:endParaRPr>
+            </a:p>
+          </p:txBody>
+        </p:sp>
+        <p:sp>
+          <p:nvSpPr>
+            <p:cNvPr id="11" name="TextBox 10"/>
+            <p:cNvSpPr txBox="1"/>
+            <p:nvPr/>
+          </p:nvSpPr>
+          <p:spPr>
+            <a:xfrm>
+              <a:off x="4269302" y="5566022"/>
+              <a:ext cx="1470082" cy="307777"/>
+            </a:xfrm>
+            <a:prstGeom prst="rect">
+              <a:avLst/>
+            </a:prstGeom>
+            <a:noFill/>
+          </p:spPr>
+          <p:txBody>
+            <a:bodyPr wrap="none" rtlCol="0">
+              <a:spAutoFit/>
+            </a:bodyPr>
+            <a:lstStyle/>
+            <a:p>
+              <a:r>
+                <a:rPr lang="en-US" sz="1400" dirty="0" smtClean="0">
+                  <a:latin typeface="Helvetica Neue" charset="0"/>
+                  <a:ea typeface="Helvetica Neue" charset="0"/>
+                  <a:cs typeface="Helvetica Neue" charset="0"/>
+                </a:rPr>
+                <a:t>Distal </a:t>
+              </a:r>
+              <a:r>
+                <a:rPr lang="en-US" sz="1400" dirty="0" err="1" smtClean="0">
+                  <a:latin typeface="Helvetica Neue" charset="0"/>
+                  <a:ea typeface="Helvetica Neue" charset="0"/>
+                  <a:cs typeface="Helvetica Neue" charset="0"/>
+                </a:rPr>
+                <a:t>Intergenic</a:t>
+              </a:r>
+              <a:endParaRPr lang="en-US" sz="1400" dirty="0">
+                <a:latin typeface="Helvetica Neue" charset="0"/>
+                <a:ea typeface="Helvetica Neue" charset="0"/>
+                <a:cs typeface="Helvetica Neue" charset="0"/>
+              </a:endParaRPr>
+            </a:p>
+          </p:txBody>
+        </p:sp>
+      </p:grpSp>
+    </p:spTree>
+    <p:extLst>
+      <p:ext uri="{BB962C8B-B14F-4D97-AF65-F5344CB8AC3E}">
+        <p14:creationId xmlns:p14="http://schemas.microsoft.com/office/powerpoint/2010/main" val="200002462"/>
       </p:ext>
     </p:extLst>
   </p:cSld>
@@ -6953,6 +9000,155 @@
           <a:chExt cx="0" cy="0"/>
         </a:xfrm>
       </p:grpSpPr>
+      <p:grpSp>
+        <p:nvGrpSpPr>
+          <p:cNvPr id="6" name="Group 5"/>
+          <p:cNvGrpSpPr/>
+          <p:nvPr/>
+        </p:nvGrpSpPr>
+        <p:grpSpPr>
+          <a:xfrm>
+            <a:off x="809520" y="415734"/>
+            <a:ext cx="3898760" cy="3947449"/>
+            <a:chOff x="2924070" y="1187259"/>
+            <a:chExt cx="3898760" cy="3947449"/>
+          </a:xfrm>
+        </p:grpSpPr>
+        <p:pic>
+          <p:nvPicPr>
+            <p:cNvPr id="2" name="Picture 1"/>
+            <p:cNvPicPr>
+              <a:picLocks noChangeAspect="1"/>
+            </p:cNvPicPr>
+            <p:nvPr/>
+          </p:nvPicPr>
+          <p:blipFill rotWithShape="1">
+            <a:blip r:embed="rId2">
+              <a:extLst>
+                <a:ext uri="{28A0092B-C50C-407E-A947-70E740481C1C}">
+                  <a14:useLocalDpi xmlns:a14="http://schemas.microsoft.com/office/drawing/2010/main" val="0"/>
+                </a:ext>
+              </a:extLst>
+            </a:blip>
+            <a:srcRect l="24254" t="20447" r="21586" b="23352"/>
+            <a:stretch/>
+          </p:blipFill>
+          <p:spPr>
+            <a:xfrm>
+              <a:off x="2924070" y="1537398"/>
+              <a:ext cx="3466682" cy="3597310"/>
+            </a:xfrm>
+            <a:prstGeom prst="rect">
+              <a:avLst/>
+            </a:prstGeom>
+          </p:spPr>
+        </p:pic>
+        <p:sp>
+          <p:nvSpPr>
+            <p:cNvPr id="3" name="Rectangle 2"/>
+            <p:cNvSpPr/>
+            <p:nvPr/>
+          </p:nvSpPr>
+          <p:spPr>
+            <a:xfrm>
+              <a:off x="6159639" y="2150347"/>
+              <a:ext cx="663191" cy="1517301"/>
+            </a:xfrm>
+            <a:prstGeom prst="rect">
+              <a:avLst/>
+            </a:prstGeom>
+            <a:solidFill>
+              <a:schemeClr val="bg1"/>
+            </a:solidFill>
+            <a:ln>
+              <a:noFill/>
+            </a:ln>
+          </p:spPr>
+          <p:style>
+            <a:lnRef idx="2">
+              <a:schemeClr val="accent1">
+                <a:shade val="50000"/>
+              </a:schemeClr>
+            </a:lnRef>
+            <a:fillRef idx="1">
+              <a:schemeClr val="accent1"/>
+            </a:fillRef>
+            <a:effectRef idx="0">
+              <a:schemeClr val="accent1"/>
+            </a:effectRef>
+            <a:fontRef idx="minor">
+              <a:schemeClr val="lt1"/>
+            </a:fontRef>
+          </p:style>
+          <p:txBody>
+            <a:bodyPr rtlCol="0" anchor="ctr"/>
+            <a:lstStyle/>
+            <a:p>
+              <a:pPr algn="ctr"/>
+              <a:endParaRPr lang="en-US"/>
+            </a:p>
+          </p:txBody>
+        </p:sp>
+        <p:pic>
+          <p:nvPicPr>
+            <p:cNvPr id="5" name="Picture 4"/>
+            <p:cNvPicPr>
+              <a:picLocks noChangeAspect="1"/>
+            </p:cNvPicPr>
+            <p:nvPr/>
+          </p:nvPicPr>
+          <p:blipFill rotWithShape="1">
+            <a:blip r:embed="rId2">
+              <a:extLst>
+                <a:ext uri="{28A0092B-C50C-407E-A947-70E740481C1C}">
+                  <a14:useLocalDpi xmlns:a14="http://schemas.microsoft.com/office/drawing/2010/main" val="0"/>
+                </a:ext>
+              </a:extLst>
+            </a:blip>
+            <a:srcRect l="52799" t="20447" r="21586" b="72064"/>
+            <a:stretch/>
+          </p:blipFill>
+          <p:spPr>
+            <a:xfrm rot="4148019" flipH="1">
+              <a:off x="5096737" y="1767354"/>
+              <a:ext cx="1639557" cy="479367"/>
+            </a:xfrm>
+            <a:prstGeom prst="rect">
+              <a:avLst/>
+            </a:prstGeom>
+          </p:spPr>
+        </p:pic>
+      </p:grpSp>
+    </p:spTree>
+    <p:extLst>
+      <p:ext uri="{BB962C8B-B14F-4D97-AF65-F5344CB8AC3E}">
+        <p14:creationId xmlns:p14="http://schemas.microsoft.com/office/powerpoint/2010/main" val="252709738"/>
+      </p:ext>
+    </p:extLst>
+  </p:cSld>
+  <p:clrMapOvr>
+    <a:masterClrMapping/>
+  </p:clrMapOvr>
+</p:sld>
+</file>
+
+<file path=ppt/slides/slide8.xml><?xml version="1.0" encoding="utf-8"?>
+<p:sld xmlns:a="http://schemas.openxmlformats.org/drawingml/2006/main" xmlns:r="http://schemas.openxmlformats.org/officeDocument/2006/relationships" xmlns:p="http://schemas.openxmlformats.org/presentationml/2006/main">
+  <p:cSld>
+    <p:spTree>
+      <p:nvGrpSpPr>
+        <p:cNvPr id="1" name=""/>
+        <p:cNvGrpSpPr/>
+        <p:nvPr/>
+      </p:nvGrpSpPr>
+      <p:grpSpPr>
+        <a:xfrm>
+          <a:off x="0" y="0"/>
+          <a:ext cx="0" cy="0"/>
+          <a:chOff x="0" y="0"/>
+          <a:chExt cx="0" cy="0"/>
+        </a:xfrm>
+      </p:grpSpPr>
       <p:sp>
         <p:nvSpPr>
           <p:cNvPr id="2" name="Title 1"/>
@@ -6970,15 +9166,134 @@
           <a:p>
             <a:r>
               <a:rPr lang="en-US" dirty="0" smtClean="0"/>
-              <a:t>Gro binding is not indicative of spreading</a:t>
+              <a:t>Gro binding is enriched within 5’ segments of genes</a:t>
             </a:r>
             <a:endParaRPr lang="en-US" dirty="0"/>
           </a:p>
         </p:txBody>
       </p:sp>
+      <p:grpSp>
+        <p:nvGrpSpPr>
+          <p:cNvPr id="7" name="Group 6"/>
+          <p:cNvGrpSpPr/>
+          <p:nvPr/>
+        </p:nvGrpSpPr>
+        <p:grpSpPr>
+          <a:xfrm>
+            <a:off x="358953" y="2229906"/>
+            <a:ext cx="3502658" cy="1748118"/>
+            <a:chOff x="402561" y="5446058"/>
+            <a:chExt cx="3502658" cy="1748118"/>
+          </a:xfrm>
+        </p:grpSpPr>
+        <p:pic>
+          <p:nvPicPr>
+            <p:cNvPr id="5" name="Picture 4"/>
+            <p:cNvPicPr>
+              <a:picLocks noChangeAspect="1"/>
+            </p:cNvPicPr>
+            <p:nvPr/>
+          </p:nvPicPr>
+          <p:blipFill rotWithShape="1">
+            <a:blip r:embed="rId2">
+              <a:extLst>
+                <a:ext uri="{28A0092B-C50C-407E-A947-70E740481C1C}">
+                  <a14:useLocalDpi xmlns:a14="http://schemas.microsoft.com/office/drawing/2010/main" val="0"/>
+                </a:ext>
+              </a:extLst>
+            </a:blip>
+            <a:srcRect t="31956" r="42075" b="30488"/>
+            <a:stretch/>
+          </p:blipFill>
+          <p:spPr>
+            <a:xfrm>
+              <a:off x="416008" y="5446058"/>
+              <a:ext cx="3489211" cy="1748118"/>
+            </a:xfrm>
+            <a:prstGeom prst="rect">
+              <a:avLst/>
+            </a:prstGeom>
+          </p:spPr>
+        </p:pic>
+        <p:sp>
+          <p:nvSpPr>
+            <p:cNvPr id="6" name="Rectangle 5"/>
+            <p:cNvSpPr/>
+            <p:nvPr/>
+          </p:nvSpPr>
+          <p:spPr>
+            <a:xfrm>
+              <a:off x="402561" y="5739098"/>
+              <a:ext cx="277710" cy="645703"/>
+            </a:xfrm>
+            <a:prstGeom prst="rect">
+              <a:avLst/>
+            </a:prstGeom>
+            <a:solidFill>
+              <a:schemeClr val="bg1"/>
+            </a:solidFill>
+            <a:ln>
+              <a:noFill/>
+            </a:ln>
+          </p:spPr>
+          <p:style>
+            <a:lnRef idx="2">
+              <a:schemeClr val="accent1">
+                <a:shade val="50000"/>
+              </a:schemeClr>
+            </a:lnRef>
+            <a:fillRef idx="1">
+              <a:schemeClr val="accent1"/>
+            </a:fillRef>
+            <a:effectRef idx="0">
+              <a:schemeClr val="accent1"/>
+            </a:effectRef>
+            <a:fontRef idx="minor">
+              <a:schemeClr val="lt1"/>
+            </a:fontRef>
+          </p:style>
+          <p:txBody>
+            <a:bodyPr rtlCol="0" anchor="ctr"/>
+            <a:lstStyle/>
+            <a:p>
+              <a:pPr algn="ctr"/>
+              <a:endParaRPr lang="en-US"/>
+            </a:p>
+          </p:txBody>
+        </p:sp>
+      </p:grpSp>
       <p:pic>
         <p:nvPicPr>
-          <p:cNvPr id="3" name="Picture 2"/>
+          <p:cNvPr id="10" name="Picture 9"/>
+          <p:cNvPicPr>
+            <a:picLocks noChangeAspect="1"/>
+          </p:cNvPicPr>
+          <p:nvPr/>
+        </p:nvPicPr>
+        <p:blipFill rotWithShape="1">
+          <a:blip r:embed="rId2">
+            <a:extLst>
+              <a:ext uri="{28A0092B-C50C-407E-A947-70E740481C1C}">
+                <a14:useLocalDpi xmlns:a14="http://schemas.microsoft.com/office/drawing/2010/main" val="0"/>
+              </a:ext>
+            </a:extLst>
+          </a:blip>
+          <a:srcRect l="57813" t="31956" b="30488"/>
+          <a:stretch/>
+        </p:blipFill>
+        <p:spPr>
+          <a:xfrm>
+            <a:off x="1495228" y="3978024"/>
+            <a:ext cx="2541195" cy="1748118"/>
+          </a:xfrm>
+          <a:prstGeom prst="rect">
+            <a:avLst/>
+          </a:prstGeom>
+        </p:spPr>
+      </p:pic>
+      <p:pic>
+        <p:nvPicPr>
+          <p:cNvPr id="12" name="Picture 11"/>
           <p:cNvPicPr>
             <a:picLocks noChangeAspect="1"/>
           </p:cNvPicPr>
@@ -6998,8 +9313,163 @@
         </p:blipFill>
         <p:spPr>
           <a:xfrm>
-            <a:off x="1206500" y="2169388"/>
-            <a:ext cx="3176751" cy="4447452"/>
+            <a:off x="4984439" y="2078808"/>
+            <a:ext cx="3375346" cy="4368095"/>
+          </a:xfrm>
+          <a:prstGeom prst="rect">
+            <a:avLst/>
+          </a:prstGeom>
+        </p:spPr>
+      </p:pic>
+      <p:sp>
+        <p:nvSpPr>
+          <p:cNvPr id="13" name="TextBox 12"/>
+          <p:cNvSpPr txBox="1"/>
+          <p:nvPr/>
+        </p:nvSpPr>
+        <p:spPr>
+          <a:xfrm>
+            <a:off x="5431639" y="1645131"/>
+            <a:ext cx="2820580" cy="584775"/>
+          </a:xfrm>
+          <a:prstGeom prst="rect">
+            <a:avLst/>
+          </a:prstGeom>
+          <a:noFill/>
+        </p:spPr>
+        <p:txBody>
+          <a:bodyPr wrap="none" rtlCol="0">
+            <a:spAutoFit/>
+          </a:bodyPr>
+          <a:lstStyle/>
+          <a:p>
+            <a:pPr algn="ctr"/>
+            <a:r>
+              <a:rPr lang="en-US" dirty="0" smtClean="0"/>
+              <a:t>Fraction of Gro binding sites</a:t>
+            </a:r>
+          </a:p>
+          <a:p>
+            <a:pPr algn="ctr"/>
+            <a:r>
+              <a:rPr lang="en-US" sz="1400" dirty="0" smtClean="0"/>
+              <a:t>Feature length normalized</a:t>
+            </a:r>
+          </a:p>
+        </p:txBody>
+      </p:sp>
+    </p:spTree>
+    <p:extLst>
+      <p:ext uri="{BB962C8B-B14F-4D97-AF65-F5344CB8AC3E}">
+        <p14:creationId xmlns:p14="http://schemas.microsoft.com/office/powerpoint/2010/main" val="753470030"/>
+      </p:ext>
+    </p:extLst>
+  </p:cSld>
+  <p:clrMapOvr>
+    <a:masterClrMapping/>
+  </p:clrMapOvr>
+  <p:timing>
+    <p:tnLst>
+      <p:par>
+        <p:cTn id="1" dur="indefinite" restart="never" nodeType="tmRoot"/>
+      </p:par>
+    </p:tnLst>
+  </p:timing>
+</p:sld>
+</file>
+
+<file path=ppt/slides/slide9.xml><?xml version="1.0" encoding="utf-8"?>
+<p:sld xmlns:a="http://schemas.openxmlformats.org/drawingml/2006/main" xmlns:r="http://schemas.openxmlformats.org/officeDocument/2006/relationships" xmlns:p="http://schemas.openxmlformats.org/presentationml/2006/main">
+  <p:cSld>
+    <p:spTree>
+      <p:nvGrpSpPr>
+        <p:cNvPr id="1" name=""/>
+        <p:cNvGrpSpPr/>
+        <p:nvPr/>
+      </p:nvGrpSpPr>
+      <p:grpSpPr>
+        <a:xfrm>
+          <a:off x="0" y="0"/>
+          <a:ext cx="0" cy="0"/>
+          <a:chOff x="0" y="0"/>
+          <a:chExt cx="0" cy="0"/>
+        </a:xfrm>
+      </p:grpSpPr>
+      <p:sp>
+        <p:nvSpPr>
+          <p:cNvPr id="2" name="Title 1"/>
+          <p:cNvSpPr>
+            <a:spLocks noGrp="1"/>
+          </p:cNvSpPr>
+          <p:nvPr>
+            <p:ph type="title"/>
+          </p:nvPr>
+        </p:nvSpPr>
+        <p:spPr/>
+        <p:txBody>
+          <a:bodyPr/>
+          <a:lstStyle/>
+          <a:p>
+            <a:r>
+              <a:rPr lang="en-US" dirty="0" smtClean="0"/>
+              <a:t>Binding sites are enriched for motifs of Gro-interacting factors</a:t>
+            </a:r>
+            <a:endParaRPr lang="en-US" dirty="0"/>
+          </a:p>
+        </p:txBody>
+      </p:sp>
+      <p:pic>
+        <p:nvPicPr>
+          <p:cNvPr id="4" name="Picture 3"/>
+          <p:cNvPicPr>
+            <a:picLocks noChangeAspect="1"/>
+          </p:cNvPicPr>
+          <p:nvPr/>
+        </p:nvPicPr>
+        <p:blipFill rotWithShape="1">
+          <a:blip r:embed="rId2">
+            <a:extLst>
+              <a:ext uri="{28A0092B-C50C-407E-A947-70E740481C1C}">
+                <a14:useLocalDpi xmlns:a14="http://schemas.microsoft.com/office/drawing/2010/main" val="0"/>
+              </a:ext>
+            </a:extLst>
+          </a:blip>
+          <a:srcRect r="20000"/>
+          <a:stretch/>
+        </p:blipFill>
+        <p:spPr>
+          <a:xfrm>
+            <a:off x="1329722" y="1747800"/>
+            <a:ext cx="5188644" cy="4577893"/>
+          </a:xfrm>
+          <a:prstGeom prst="rect">
+            <a:avLst/>
+          </a:prstGeom>
+        </p:spPr>
+      </p:pic>
+      <p:pic>
+        <p:nvPicPr>
+          <p:cNvPr id="5" name="Picture 4"/>
+          <p:cNvPicPr>
+            <a:picLocks noChangeAspect="1"/>
+          </p:cNvPicPr>
+          <p:nvPr/>
+        </p:nvPicPr>
+        <p:blipFill rotWithShape="1">
+          <a:blip r:embed="rId2">
+            <a:extLst>
+              <a:ext uri="{28A0092B-C50C-407E-A947-70E740481C1C}">
+                <a14:useLocalDpi xmlns:a14="http://schemas.microsoft.com/office/drawing/2010/main" val="0"/>
+              </a:ext>
+            </a:extLst>
+          </a:blip>
+          <a:srcRect l="79883" t="41192" b="43729"/>
+          <a:stretch/>
+        </p:blipFill>
+        <p:spPr>
+          <a:xfrm>
+            <a:off x="6518366" y="3388140"/>
+            <a:ext cx="1836001" cy="971373"/>
           </a:xfrm>
           <a:prstGeom prst="rect">
             <a:avLst/>
@@ -7009,7 +9479,7 @@
     </p:spTree>
     <p:extLst>
       <p:ext uri="{BB962C8B-B14F-4D97-AF65-F5344CB8AC3E}">
-        <p14:creationId xmlns:p14="http://schemas.microsoft.com/office/powerpoint/2010/main" val="1657950135"/>
+        <p14:creationId xmlns:p14="http://schemas.microsoft.com/office/powerpoint/2010/main" val="2007211498"/>
       </p:ext>
     </p:extLst>
   </p:cSld>

</xml_diff>